<commit_message>
Finsished research presentation for weekly update
</commit_message>
<xml_diff>
--- a/Research Update 4.20.2017.pptx
+++ b/Research Update 4.20.2017.pptx
@@ -7,6 +7,17 @@
   <p:sldIdLst>
     <p:sldId id="256" r:id="rId2"/>
     <p:sldId id="257" r:id="rId3"/>
+    <p:sldId id="258" r:id="rId4"/>
+    <p:sldId id="261" r:id="rId5"/>
+    <p:sldId id="259" r:id="rId6"/>
+    <p:sldId id="260" r:id="rId7"/>
+    <p:sldId id="262" r:id="rId8"/>
+    <p:sldId id="265" r:id="rId9"/>
+    <p:sldId id="266" r:id="rId10"/>
+    <p:sldId id="267" r:id="rId11"/>
+    <p:sldId id="264" r:id="rId12"/>
+    <p:sldId id="263" r:id="rId13"/>
+    <p:sldId id="268" r:id="rId14"/>
   </p:sldIdLst>
   <p:sldSz cx="12192000" cy="6858000"/>
   <p:notesSz cx="6858000" cy="9144000"/>
@@ -105,6 +116,11 @@
       </a:defRPr>
     </a:lvl9pPr>
   </p:defaultTextStyle>
+  <p:extLst>
+    <p:ext uri="{EFAFB233-063F-42B5-8137-9DF3F51BA10A}">
+      <p15:sldGuideLst xmlns:p15="http://schemas.microsoft.com/office/powerpoint/2012/main"/>
+    </p:ext>
+  </p:extLst>
 </p:presentation>
 </file>
 
@@ -239,7 +255,7 @@
           <a:p>
             <a:fld id="{B1AC3815-3AAC-4F04-B467-DBE0AB05EF43}" type="datetimeFigureOut">
               <a:rPr lang="en-US" smtClean="0"/>
-              <a:t>4/21/2017</a:t>
+              <a:t>4/24/2017</a:t>
             </a:fld>
             <a:endParaRPr lang="en-US"/>
           </a:p>
@@ -409,7 +425,7 @@
           <a:p>
             <a:fld id="{B1AC3815-3AAC-4F04-B467-DBE0AB05EF43}" type="datetimeFigureOut">
               <a:rPr lang="en-US" smtClean="0"/>
-              <a:t>4/21/2017</a:t>
+              <a:t>4/24/2017</a:t>
             </a:fld>
             <a:endParaRPr lang="en-US"/>
           </a:p>
@@ -589,7 +605,7 @@
           <a:p>
             <a:fld id="{B1AC3815-3AAC-4F04-B467-DBE0AB05EF43}" type="datetimeFigureOut">
               <a:rPr lang="en-US" smtClean="0"/>
-              <a:t>4/21/2017</a:t>
+              <a:t>4/24/2017</a:t>
             </a:fld>
             <a:endParaRPr lang="en-US"/>
           </a:p>
@@ -759,7 +775,7 @@
           <a:p>
             <a:fld id="{B1AC3815-3AAC-4F04-B467-DBE0AB05EF43}" type="datetimeFigureOut">
               <a:rPr lang="en-US" smtClean="0"/>
-              <a:t>4/21/2017</a:t>
+              <a:t>4/24/2017</a:t>
             </a:fld>
             <a:endParaRPr lang="en-US"/>
           </a:p>
@@ -1005,7 +1021,7 @@
           <a:p>
             <a:fld id="{B1AC3815-3AAC-4F04-B467-DBE0AB05EF43}" type="datetimeFigureOut">
               <a:rPr lang="en-US" smtClean="0"/>
-              <a:t>4/21/2017</a:t>
+              <a:t>4/24/2017</a:t>
             </a:fld>
             <a:endParaRPr lang="en-US"/>
           </a:p>
@@ -1237,7 +1253,7 @@
           <a:p>
             <a:fld id="{B1AC3815-3AAC-4F04-B467-DBE0AB05EF43}" type="datetimeFigureOut">
               <a:rPr lang="en-US" smtClean="0"/>
-              <a:t>4/21/2017</a:t>
+              <a:t>4/24/2017</a:t>
             </a:fld>
             <a:endParaRPr lang="en-US"/>
           </a:p>
@@ -1604,7 +1620,7 @@
           <a:p>
             <a:fld id="{B1AC3815-3AAC-4F04-B467-DBE0AB05EF43}" type="datetimeFigureOut">
               <a:rPr lang="en-US" smtClean="0"/>
-              <a:t>4/21/2017</a:t>
+              <a:t>4/24/2017</a:t>
             </a:fld>
             <a:endParaRPr lang="en-US"/>
           </a:p>
@@ -1722,7 +1738,7 @@
           <a:p>
             <a:fld id="{B1AC3815-3AAC-4F04-B467-DBE0AB05EF43}" type="datetimeFigureOut">
               <a:rPr lang="en-US" smtClean="0"/>
-              <a:t>4/21/2017</a:t>
+              <a:t>4/24/2017</a:t>
             </a:fld>
             <a:endParaRPr lang="en-US"/>
           </a:p>
@@ -1817,7 +1833,7 @@
           <a:p>
             <a:fld id="{B1AC3815-3AAC-4F04-B467-DBE0AB05EF43}" type="datetimeFigureOut">
               <a:rPr lang="en-US" smtClean="0"/>
-              <a:t>4/21/2017</a:t>
+              <a:t>4/24/2017</a:t>
             </a:fld>
             <a:endParaRPr lang="en-US"/>
           </a:p>
@@ -2094,7 +2110,7 @@
           <a:p>
             <a:fld id="{B1AC3815-3AAC-4F04-B467-DBE0AB05EF43}" type="datetimeFigureOut">
               <a:rPr lang="en-US" smtClean="0"/>
-              <a:t>4/21/2017</a:t>
+              <a:t>4/24/2017</a:t>
             </a:fld>
             <a:endParaRPr lang="en-US"/>
           </a:p>
@@ -2347,7 +2363,7 @@
           <a:p>
             <a:fld id="{B1AC3815-3AAC-4F04-B467-DBE0AB05EF43}" type="datetimeFigureOut">
               <a:rPr lang="en-US" smtClean="0"/>
-              <a:t>4/21/2017</a:t>
+              <a:t>4/24/2017</a:t>
             </a:fld>
             <a:endParaRPr lang="en-US"/>
           </a:p>
@@ -2560,7 +2576,7 @@
           <a:p>
             <a:fld id="{B1AC3815-3AAC-4F04-B467-DBE0AB05EF43}" type="datetimeFigureOut">
               <a:rPr lang="en-US" smtClean="0"/>
-              <a:t>4/21/2017</a:t>
+              <a:t>4/24/2017</a:t>
             </a:fld>
             <a:endParaRPr lang="en-US"/>
           </a:p>
@@ -3023,6 +3039,415 @@
 </p:sld>
 </file>
 
+<file path=ppt/slides/slide10.xml><?xml version="1.0" encoding="utf-8"?>
+<p:sld xmlns:a="http://schemas.openxmlformats.org/drawingml/2006/main" xmlns:r="http://schemas.openxmlformats.org/officeDocument/2006/relationships" xmlns:p="http://schemas.openxmlformats.org/presentationml/2006/main">
+  <p:cSld>
+    <p:spTree>
+      <p:nvGrpSpPr>
+        <p:cNvPr id="1" name=""/>
+        <p:cNvGrpSpPr/>
+        <p:nvPr/>
+      </p:nvGrpSpPr>
+      <p:grpSpPr>
+        <a:xfrm>
+          <a:off x="0" y="0"/>
+          <a:ext cx="0" cy="0"/>
+          <a:chOff x="0" y="0"/>
+          <a:chExt cx="0" cy="0"/>
+        </a:xfrm>
+      </p:grpSpPr>
+      <p:sp>
+        <p:nvSpPr>
+          <p:cNvPr id="2" name="Title 1"/>
+          <p:cNvSpPr>
+            <a:spLocks noGrp="1"/>
+          </p:cNvSpPr>
+          <p:nvPr>
+            <p:ph type="title"/>
+          </p:nvPr>
+        </p:nvSpPr>
+        <p:spPr/>
+        <p:txBody>
+          <a:bodyPr/>
+          <a:lstStyle/>
+          <a:p>
+            <a:r>
+              <a:rPr lang="en-US" dirty="0" smtClean="0"/>
+              <a:t>Looking at our Discrete </a:t>
+            </a:r>
+            <a:r>
+              <a:rPr lang="en-US" dirty="0" err="1" smtClean="0"/>
+              <a:t>Hankel</a:t>
+            </a:r>
+            <a:r>
+              <a:rPr lang="en-US" dirty="0" smtClean="0"/>
+              <a:t> Transform:</a:t>
+            </a:r>
+            <a:endParaRPr lang="en-US" dirty="0"/>
+          </a:p>
+        </p:txBody>
+      </p:sp>
+      <p:pic>
+        <p:nvPicPr>
+          <p:cNvPr id="3" name="Picture 2"/>
+          <p:cNvPicPr>
+            <a:picLocks noChangeAspect="1"/>
+          </p:cNvPicPr>
+          <p:nvPr/>
+        </p:nvPicPr>
+        <p:blipFill>
+          <a:blip r:embed="rId2"/>
+          <a:stretch>
+            <a:fillRect/>
+          </a:stretch>
+        </p:blipFill>
+        <p:spPr>
+          <a:xfrm>
+            <a:off x="2616606" y="2027769"/>
+            <a:ext cx="4475311" cy="351304"/>
+          </a:xfrm>
+          <a:prstGeom prst="rect">
+            <a:avLst/>
+          </a:prstGeom>
+        </p:spPr>
+      </p:pic>
+      <p:sp>
+        <p:nvSpPr>
+          <p:cNvPr id="4" name="TextBox 3"/>
+          <p:cNvSpPr txBox="1"/>
+          <p:nvPr/>
+        </p:nvSpPr>
+        <p:spPr>
+          <a:xfrm>
+            <a:off x="1775637" y="3806456"/>
+            <a:ext cx="10004342" cy="369332"/>
+          </a:xfrm>
+          <a:prstGeom prst="rect">
+            <a:avLst/>
+          </a:prstGeom>
+          <a:noFill/>
+        </p:spPr>
+        <p:txBody>
+          <a:bodyPr wrap="none" rtlCol="0">
+            <a:spAutoFit/>
+          </a:bodyPr>
+          <a:lstStyle/>
+          <a:p>
+            <a:r>
+              <a:rPr lang="en-US" dirty="0" smtClean="0"/>
+              <a:t>The reflection at each point k is calculated individually, so the difference between f values has no impact.</a:t>
+            </a:r>
+            <a:endParaRPr lang="en-US" dirty="0"/>
+          </a:p>
+        </p:txBody>
+      </p:sp>
+      <p:sp>
+        <p:nvSpPr>
+          <p:cNvPr id="5" name="TextBox 4"/>
+          <p:cNvSpPr txBox="1"/>
+          <p:nvPr/>
+        </p:nvSpPr>
+        <p:spPr>
+          <a:xfrm>
+            <a:off x="1860698" y="4572001"/>
+            <a:ext cx="8084264" cy="369332"/>
+          </a:xfrm>
+          <a:prstGeom prst="rect">
+            <a:avLst/>
+          </a:prstGeom>
+          <a:noFill/>
+        </p:spPr>
+        <p:txBody>
+          <a:bodyPr wrap="none" rtlCol="0">
+            <a:spAutoFit/>
+          </a:bodyPr>
+          <a:lstStyle/>
+          <a:p>
+            <a:r>
+              <a:rPr lang="en-US" dirty="0" smtClean="0"/>
+              <a:t>When we choose f we are choosing points to sample the “continuous” transform at. </a:t>
+            </a:r>
+            <a:endParaRPr lang="en-US" dirty="0"/>
+          </a:p>
+        </p:txBody>
+      </p:sp>
+    </p:spTree>
+    <p:extLst>
+      <p:ext uri="{BB962C8B-B14F-4D97-AF65-F5344CB8AC3E}">
+        <p14:creationId xmlns:p14="http://schemas.microsoft.com/office/powerpoint/2010/main" val="2288134425"/>
+      </p:ext>
+    </p:extLst>
+  </p:cSld>
+  <p:clrMapOvr>
+    <a:masterClrMapping/>
+  </p:clrMapOvr>
+</p:sld>
+</file>
+
+<file path=ppt/slides/slide11.xml><?xml version="1.0" encoding="utf-8"?>
+<p:sld xmlns:a="http://schemas.openxmlformats.org/drawingml/2006/main" xmlns:r="http://schemas.openxmlformats.org/officeDocument/2006/relationships" xmlns:p="http://schemas.openxmlformats.org/presentationml/2006/main">
+  <p:cSld>
+    <p:spTree>
+      <p:nvGrpSpPr>
+        <p:cNvPr id="1" name=""/>
+        <p:cNvGrpSpPr/>
+        <p:nvPr/>
+      </p:nvGrpSpPr>
+      <p:grpSpPr>
+        <a:xfrm>
+          <a:off x="0" y="0"/>
+          <a:ext cx="0" cy="0"/>
+          <a:chOff x="0" y="0"/>
+          <a:chExt cx="0" cy="0"/>
+        </a:xfrm>
+      </p:grpSpPr>
+      <p:sp>
+        <p:nvSpPr>
+          <p:cNvPr id="2" name="Title 1"/>
+          <p:cNvSpPr>
+            <a:spLocks noGrp="1"/>
+          </p:cNvSpPr>
+          <p:nvPr>
+            <p:ph type="title"/>
+          </p:nvPr>
+        </p:nvSpPr>
+        <p:spPr/>
+        <p:txBody>
+          <a:bodyPr/>
+          <a:lstStyle/>
+          <a:p>
+            <a:r>
+              <a:rPr lang="en-US" dirty="0" smtClean="0"/>
+              <a:t>GPU and local match perfectly after matching parameters</a:t>
+            </a:r>
+            <a:endParaRPr lang="en-US" dirty="0"/>
+          </a:p>
+        </p:txBody>
+      </p:sp>
+      <p:pic>
+        <p:nvPicPr>
+          <p:cNvPr id="3" name="Picture 2"/>
+          <p:cNvPicPr>
+            <a:picLocks noChangeAspect="1"/>
+          </p:cNvPicPr>
+          <p:nvPr/>
+        </p:nvPicPr>
+        <p:blipFill>
+          <a:blip r:embed="rId2"/>
+          <a:stretch>
+            <a:fillRect/>
+          </a:stretch>
+        </p:blipFill>
+        <p:spPr>
+          <a:xfrm>
+            <a:off x="1966036" y="2008316"/>
+            <a:ext cx="6008382" cy="4498810"/>
+          </a:xfrm>
+          <a:prstGeom prst="rect">
+            <a:avLst/>
+          </a:prstGeom>
+        </p:spPr>
+      </p:pic>
+    </p:spTree>
+    <p:extLst>
+      <p:ext uri="{BB962C8B-B14F-4D97-AF65-F5344CB8AC3E}">
+        <p14:creationId xmlns:p14="http://schemas.microsoft.com/office/powerpoint/2010/main" val="3796969542"/>
+      </p:ext>
+    </p:extLst>
+  </p:cSld>
+  <p:clrMapOvr>
+    <a:masterClrMapping/>
+  </p:clrMapOvr>
+</p:sld>
+</file>
+
+<file path=ppt/slides/slide12.xml><?xml version="1.0" encoding="utf-8"?>
+<p:sld xmlns:a="http://schemas.openxmlformats.org/drawingml/2006/main" xmlns:r="http://schemas.openxmlformats.org/officeDocument/2006/relationships" xmlns:p="http://schemas.openxmlformats.org/presentationml/2006/main">
+  <p:cSld>
+    <p:spTree>
+      <p:nvGrpSpPr>
+        <p:cNvPr id="1" name=""/>
+        <p:cNvGrpSpPr/>
+        <p:nvPr/>
+      </p:nvGrpSpPr>
+      <p:grpSpPr>
+        <a:xfrm>
+          <a:off x="0" y="0"/>
+          <a:ext cx="0" cy="0"/>
+          <a:chOff x="0" y="0"/>
+          <a:chExt cx="0" cy="0"/>
+        </a:xfrm>
+      </p:grpSpPr>
+      <p:sp>
+        <p:nvSpPr>
+          <p:cNvPr id="2" name="Title 1"/>
+          <p:cNvSpPr>
+            <a:spLocks noGrp="1"/>
+          </p:cNvSpPr>
+          <p:nvPr>
+            <p:ph type="title"/>
+          </p:nvPr>
+        </p:nvSpPr>
+        <p:spPr/>
+        <p:txBody>
+          <a:bodyPr/>
+          <a:lstStyle/>
+          <a:p>
+            <a:r>
+              <a:rPr lang="en-US" dirty="0" smtClean="0"/>
+              <a:t>One parameter I haven’t accounted for</a:t>
+            </a:r>
+            <a:endParaRPr lang="en-US" dirty="0"/>
+          </a:p>
+        </p:txBody>
+      </p:sp>
+      <p:sp>
+        <p:nvSpPr>
+          <p:cNvPr id="4" name="TextBox 3"/>
+          <p:cNvSpPr txBox="1"/>
+          <p:nvPr/>
+        </p:nvSpPr>
+        <p:spPr>
+          <a:xfrm>
+            <a:off x="3168503" y="1988288"/>
+            <a:ext cx="3738844" cy="369332"/>
+          </a:xfrm>
+          <a:prstGeom prst="rect">
+            <a:avLst/>
+          </a:prstGeom>
+          <a:noFill/>
+        </p:spPr>
+        <p:txBody>
+          <a:bodyPr wrap="none" rtlCol="0">
+            <a:spAutoFit/>
+          </a:bodyPr>
+          <a:lstStyle/>
+          <a:p>
+            <a:r>
+              <a:rPr lang="en-US" dirty="0" smtClean="0"/>
+              <a:t>A detector </a:t>
+            </a:r>
+            <a:r>
+              <a:rPr lang="en-US" dirty="0"/>
+              <a:t>numerical aperture of 0.22</a:t>
+            </a:r>
+          </a:p>
+        </p:txBody>
+      </p:sp>
+    </p:spTree>
+    <p:extLst>
+      <p:ext uri="{BB962C8B-B14F-4D97-AF65-F5344CB8AC3E}">
+        <p14:creationId xmlns:p14="http://schemas.microsoft.com/office/powerpoint/2010/main" val="3582238161"/>
+      </p:ext>
+    </p:extLst>
+  </p:cSld>
+  <p:clrMapOvr>
+    <a:masterClrMapping/>
+  </p:clrMapOvr>
+</p:sld>
+</file>
+
+<file path=ppt/slides/slide13.xml><?xml version="1.0" encoding="utf-8"?>
+<p:sld xmlns:a="http://schemas.openxmlformats.org/drawingml/2006/main" xmlns:r="http://schemas.openxmlformats.org/officeDocument/2006/relationships" xmlns:p="http://schemas.openxmlformats.org/presentationml/2006/main">
+  <p:cSld>
+    <p:spTree>
+      <p:nvGrpSpPr>
+        <p:cNvPr id="1" name=""/>
+        <p:cNvGrpSpPr/>
+        <p:nvPr/>
+      </p:nvGrpSpPr>
+      <p:grpSpPr>
+        <a:xfrm>
+          <a:off x="0" y="0"/>
+          <a:ext cx="0" cy="0"/>
+          <a:chOff x="0" y="0"/>
+          <a:chExt cx="0" cy="0"/>
+        </a:xfrm>
+      </p:grpSpPr>
+      <p:sp>
+        <p:nvSpPr>
+          <p:cNvPr id="2" name="Title 1"/>
+          <p:cNvSpPr>
+            <a:spLocks noGrp="1"/>
+          </p:cNvSpPr>
+          <p:nvPr>
+            <p:ph type="title"/>
+          </p:nvPr>
+        </p:nvSpPr>
+        <p:spPr/>
+        <p:txBody>
+          <a:bodyPr/>
+          <a:lstStyle/>
+          <a:p>
+            <a:r>
+              <a:rPr lang="en-US" dirty="0" smtClean="0"/>
+              <a:t>One other issue</a:t>
+            </a:r>
+            <a:endParaRPr lang="en-US" dirty="0"/>
+          </a:p>
+        </p:txBody>
+      </p:sp>
+      <p:sp>
+        <p:nvSpPr>
+          <p:cNvPr id="3" name="TextBox 2"/>
+          <p:cNvSpPr txBox="1"/>
+          <p:nvPr/>
+        </p:nvSpPr>
+        <p:spPr>
+          <a:xfrm>
+            <a:off x="1456660" y="2647507"/>
+            <a:ext cx="4291944" cy="923330"/>
+          </a:xfrm>
+          <a:prstGeom prst="rect">
+            <a:avLst/>
+          </a:prstGeom>
+          <a:noFill/>
+        </p:spPr>
+        <p:txBody>
+          <a:bodyPr wrap="none" rtlCol="0">
+            <a:spAutoFit/>
+          </a:bodyPr>
+          <a:lstStyle/>
+          <a:p>
+            <a:r>
+              <a:rPr lang="en-US" dirty="0" err="1" smtClean="0"/>
+              <a:t>Distance_mm</a:t>
+            </a:r>
+            <a:r>
+              <a:rPr lang="en-US" dirty="0" smtClean="0"/>
+              <a:t>(1) = half of specified </a:t>
+            </a:r>
+            <a:r>
+              <a:rPr lang="en-US" smtClean="0"/>
+              <a:t>step size</a:t>
+            </a:r>
+            <a:endParaRPr lang="en-US" dirty="0" smtClean="0"/>
+          </a:p>
+          <a:p>
+            <a:endParaRPr lang="en-US" dirty="0"/>
+          </a:p>
+          <a:p>
+            <a:r>
+              <a:rPr lang="en-US" dirty="0" smtClean="0"/>
+              <a:t>Distance doesn’t start at 0!</a:t>
+            </a:r>
+            <a:endParaRPr lang="en-US" dirty="0"/>
+          </a:p>
+        </p:txBody>
+      </p:sp>
+    </p:spTree>
+    <p:extLst>
+      <p:ext uri="{BB962C8B-B14F-4D97-AF65-F5344CB8AC3E}">
+        <p14:creationId xmlns:p14="http://schemas.microsoft.com/office/powerpoint/2010/main" val="1199374305"/>
+      </p:ext>
+    </p:extLst>
+  </p:cSld>
+  <p:clrMapOvr>
+    <a:masterClrMapping/>
+  </p:clrMapOvr>
+</p:sld>
+</file>
+
 <file path=ppt/slides/slide2.xml><?xml version="1.0" encoding="utf-8"?>
 <p:sld xmlns:a="http://schemas.openxmlformats.org/drawingml/2006/main" xmlns:r="http://schemas.openxmlformats.org/officeDocument/2006/relationships" xmlns:p="http://schemas.openxmlformats.org/presentationml/2006/main">
   <p:cSld>
@@ -3081,6 +3506,712 @@
       </p:par>
     </p:tnLst>
   </p:timing>
+</p:sld>
+</file>
+
+<file path=ppt/slides/slide3.xml><?xml version="1.0" encoding="utf-8"?>
+<p:sld xmlns:a="http://schemas.openxmlformats.org/drawingml/2006/main" xmlns:r="http://schemas.openxmlformats.org/officeDocument/2006/relationships" xmlns:p="http://schemas.openxmlformats.org/presentationml/2006/main">
+  <p:cSld>
+    <p:spTree>
+      <p:nvGrpSpPr>
+        <p:cNvPr id="1" name=""/>
+        <p:cNvGrpSpPr/>
+        <p:nvPr/>
+      </p:nvGrpSpPr>
+      <p:grpSpPr>
+        <a:xfrm>
+          <a:off x="0" y="0"/>
+          <a:ext cx="0" cy="0"/>
+          <a:chOff x="0" y="0"/>
+          <a:chExt cx="0" cy="0"/>
+        </a:xfrm>
+      </p:grpSpPr>
+      <p:pic>
+        <p:nvPicPr>
+          <p:cNvPr id="2" name="Picture 1"/>
+          <p:cNvPicPr>
+            <a:picLocks noChangeAspect="1"/>
+          </p:cNvPicPr>
+          <p:nvPr/>
+        </p:nvPicPr>
+        <p:blipFill>
+          <a:blip r:embed="rId2"/>
+          <a:stretch>
+            <a:fillRect/>
+          </a:stretch>
+        </p:blipFill>
+        <p:spPr>
+          <a:xfrm>
+            <a:off x="2416338" y="1781631"/>
+            <a:ext cx="5918568" cy="4431561"/>
+          </a:xfrm>
+          <a:prstGeom prst="rect">
+            <a:avLst/>
+          </a:prstGeom>
+        </p:spPr>
+      </p:pic>
+      <p:sp>
+        <p:nvSpPr>
+          <p:cNvPr id="4" name="Title 3"/>
+          <p:cNvSpPr>
+            <a:spLocks noGrp="1"/>
+          </p:cNvSpPr>
+          <p:nvPr>
+            <p:ph type="title"/>
+          </p:nvPr>
+        </p:nvSpPr>
+        <p:spPr/>
+        <p:txBody>
+          <a:bodyPr/>
+          <a:lstStyle/>
+          <a:p>
+            <a:r>
+              <a:rPr lang="en-US" dirty="0" err="1" smtClean="0"/>
+              <a:t>Baddour</a:t>
+            </a:r>
+            <a:r>
+              <a:rPr lang="en-US" dirty="0" smtClean="0"/>
+              <a:t> transform failed simple example</a:t>
+            </a:r>
+            <a:endParaRPr lang="en-US" dirty="0"/>
+          </a:p>
+        </p:txBody>
+      </p:sp>
+    </p:spTree>
+    <p:extLst>
+      <p:ext uri="{BB962C8B-B14F-4D97-AF65-F5344CB8AC3E}">
+        <p14:creationId xmlns:p14="http://schemas.microsoft.com/office/powerpoint/2010/main" val="1818640448"/>
+      </p:ext>
+    </p:extLst>
+  </p:cSld>
+  <p:clrMapOvr>
+    <a:masterClrMapping/>
+  </p:clrMapOvr>
+</p:sld>
+</file>
+
+<file path=ppt/slides/slide4.xml><?xml version="1.0" encoding="utf-8"?>
+<p:sld xmlns:a="http://schemas.openxmlformats.org/drawingml/2006/main" xmlns:r="http://schemas.openxmlformats.org/officeDocument/2006/relationships" xmlns:p="http://schemas.openxmlformats.org/presentationml/2006/main">
+  <p:cSld>
+    <p:spTree>
+      <p:nvGrpSpPr>
+        <p:cNvPr id="1" name=""/>
+        <p:cNvGrpSpPr/>
+        <p:nvPr/>
+      </p:nvGrpSpPr>
+      <p:grpSpPr>
+        <a:xfrm>
+          <a:off x="0" y="0"/>
+          <a:ext cx="0" cy="0"/>
+          <a:chOff x="0" y="0"/>
+          <a:chExt cx="0" cy="0"/>
+        </a:xfrm>
+      </p:grpSpPr>
+      <p:sp>
+        <p:nvSpPr>
+          <p:cNvPr id="2" name="Title 1"/>
+          <p:cNvSpPr>
+            <a:spLocks noGrp="1"/>
+          </p:cNvSpPr>
+          <p:nvPr>
+            <p:ph type="title"/>
+          </p:nvPr>
+        </p:nvSpPr>
+        <p:spPr/>
+        <p:txBody>
+          <a:bodyPr/>
+          <a:lstStyle/>
+          <a:p>
+            <a:r>
+              <a:rPr lang="en-US" dirty="0" smtClean="0"/>
+              <a:t>Frequency and space sampler also did not work</a:t>
+            </a:r>
+            <a:endParaRPr lang="en-US" dirty="0"/>
+          </a:p>
+        </p:txBody>
+      </p:sp>
+      <p:pic>
+        <p:nvPicPr>
+          <p:cNvPr id="3" name="Picture 2"/>
+          <p:cNvPicPr>
+            <a:picLocks noChangeAspect="1"/>
+          </p:cNvPicPr>
+          <p:nvPr/>
+        </p:nvPicPr>
+        <p:blipFill>
+          <a:blip r:embed="rId2"/>
+          <a:stretch>
+            <a:fillRect/>
+          </a:stretch>
+        </p:blipFill>
+        <p:spPr>
+          <a:xfrm>
+            <a:off x="3132492" y="2097818"/>
+            <a:ext cx="5646458" cy="4227817"/>
+          </a:xfrm>
+          <a:prstGeom prst="rect">
+            <a:avLst/>
+          </a:prstGeom>
+        </p:spPr>
+      </p:pic>
+    </p:spTree>
+    <p:extLst>
+      <p:ext uri="{BB962C8B-B14F-4D97-AF65-F5344CB8AC3E}">
+        <p14:creationId xmlns:p14="http://schemas.microsoft.com/office/powerpoint/2010/main" val="2295052587"/>
+      </p:ext>
+    </p:extLst>
+  </p:cSld>
+  <p:clrMapOvr>
+    <a:masterClrMapping/>
+  </p:clrMapOvr>
+</p:sld>
+</file>
+
+<file path=ppt/slides/slide5.xml><?xml version="1.0" encoding="utf-8"?>
+<p:sld xmlns:a="http://schemas.openxmlformats.org/drawingml/2006/main" xmlns:r="http://schemas.openxmlformats.org/officeDocument/2006/relationships" xmlns:p="http://schemas.openxmlformats.org/presentationml/2006/main">
+  <p:cSld>
+    <p:spTree>
+      <p:nvGrpSpPr>
+        <p:cNvPr id="1" name=""/>
+        <p:cNvGrpSpPr/>
+        <p:nvPr/>
+      </p:nvGrpSpPr>
+      <p:grpSpPr>
+        <a:xfrm>
+          <a:off x="0" y="0"/>
+          <a:ext cx="0" cy="0"/>
+          <a:chOff x="0" y="0"/>
+          <a:chExt cx="0" cy="0"/>
+        </a:xfrm>
+      </p:grpSpPr>
+      <p:pic>
+        <p:nvPicPr>
+          <p:cNvPr id="2" name="Picture 1"/>
+          <p:cNvPicPr>
+            <a:picLocks noChangeAspect="1"/>
+          </p:cNvPicPr>
+          <p:nvPr/>
+        </p:nvPicPr>
+        <p:blipFill>
+          <a:blip r:embed="rId2"/>
+          <a:stretch>
+            <a:fillRect/>
+          </a:stretch>
+        </p:blipFill>
+        <p:spPr>
+          <a:xfrm>
+            <a:off x="0" y="2167551"/>
+            <a:ext cx="5334876" cy="3994518"/>
+          </a:xfrm>
+          <a:prstGeom prst="rect">
+            <a:avLst/>
+          </a:prstGeom>
+        </p:spPr>
+      </p:pic>
+      <p:sp>
+        <p:nvSpPr>
+          <p:cNvPr id="3" name="TextBox 2"/>
+          <p:cNvSpPr txBox="1"/>
+          <p:nvPr/>
+        </p:nvSpPr>
+        <p:spPr>
+          <a:xfrm>
+            <a:off x="685436" y="1798219"/>
+            <a:ext cx="1627369" cy="369332"/>
+          </a:xfrm>
+          <a:prstGeom prst="rect">
+            <a:avLst/>
+          </a:prstGeom>
+          <a:noFill/>
+        </p:spPr>
+        <p:txBody>
+          <a:bodyPr wrap="none" rtlCol="0">
+            <a:spAutoFit/>
+          </a:bodyPr>
+          <a:lstStyle/>
+          <a:p>
+            <a:r>
+              <a:rPr lang="en-US" dirty="0" smtClean="0"/>
+              <a:t>K =r * 2 * pi /M</a:t>
+            </a:r>
+            <a:endParaRPr lang="en-US" dirty="0"/>
+          </a:p>
+        </p:txBody>
+      </p:sp>
+      <p:pic>
+        <p:nvPicPr>
+          <p:cNvPr id="4" name="Picture 3"/>
+          <p:cNvPicPr>
+            <a:picLocks noChangeAspect="1"/>
+          </p:cNvPicPr>
+          <p:nvPr/>
+        </p:nvPicPr>
+        <p:blipFill>
+          <a:blip r:embed="rId3"/>
+          <a:stretch>
+            <a:fillRect/>
+          </a:stretch>
+        </p:blipFill>
+        <p:spPr>
+          <a:xfrm>
+            <a:off x="5188689" y="2130981"/>
+            <a:ext cx="5383716" cy="4031088"/>
+          </a:xfrm>
+          <a:prstGeom prst="rect">
+            <a:avLst/>
+          </a:prstGeom>
+        </p:spPr>
+      </p:pic>
+      <p:sp>
+        <p:nvSpPr>
+          <p:cNvPr id="5" name="TextBox 4"/>
+          <p:cNvSpPr txBox="1"/>
+          <p:nvPr/>
+        </p:nvSpPr>
+        <p:spPr>
+          <a:xfrm>
+            <a:off x="5975498" y="1723779"/>
+            <a:ext cx="1002197" cy="369332"/>
+          </a:xfrm>
+          <a:prstGeom prst="rect">
+            <a:avLst/>
+          </a:prstGeom>
+          <a:noFill/>
+        </p:spPr>
+        <p:txBody>
+          <a:bodyPr wrap="none" rtlCol="0">
+            <a:spAutoFit/>
+          </a:bodyPr>
+          <a:lstStyle/>
+          <a:p>
+            <a:r>
+              <a:rPr lang="en-US" dirty="0" smtClean="0"/>
+              <a:t>K = 0:1:6</a:t>
+            </a:r>
+            <a:endParaRPr lang="en-US" dirty="0"/>
+          </a:p>
+        </p:txBody>
+      </p:sp>
+      <p:sp>
+        <p:nvSpPr>
+          <p:cNvPr id="11" name="Title 10"/>
+          <p:cNvSpPr>
+            <a:spLocks noGrp="1"/>
+          </p:cNvSpPr>
+          <p:nvPr>
+            <p:ph type="title"/>
+          </p:nvPr>
+        </p:nvSpPr>
+        <p:spPr/>
+        <p:txBody>
+          <a:bodyPr/>
+          <a:lstStyle/>
+          <a:p>
+            <a:r>
+              <a:rPr lang="en-US" dirty="0" smtClean="0"/>
+              <a:t>Transforms seem relatively invariant to frequency sampling methods</a:t>
+            </a:r>
+            <a:endParaRPr lang="en-US" dirty="0"/>
+          </a:p>
+        </p:txBody>
+      </p:sp>
+    </p:spTree>
+    <p:extLst>
+      <p:ext uri="{BB962C8B-B14F-4D97-AF65-F5344CB8AC3E}">
+        <p14:creationId xmlns:p14="http://schemas.microsoft.com/office/powerpoint/2010/main" val="1306251147"/>
+      </p:ext>
+    </p:extLst>
+  </p:cSld>
+  <p:clrMapOvr>
+    <a:masterClrMapping/>
+  </p:clrMapOvr>
+</p:sld>
+</file>
+
+<file path=ppt/slides/slide6.xml><?xml version="1.0" encoding="utf-8"?>
+<p:sld xmlns:a="http://schemas.openxmlformats.org/drawingml/2006/main" xmlns:r="http://schemas.openxmlformats.org/officeDocument/2006/relationships" xmlns:p="http://schemas.openxmlformats.org/presentationml/2006/main">
+  <p:cSld>
+    <p:spTree>
+      <p:nvGrpSpPr>
+        <p:cNvPr id="1" name=""/>
+        <p:cNvGrpSpPr/>
+        <p:nvPr/>
+      </p:nvGrpSpPr>
+      <p:grpSpPr>
+        <a:xfrm>
+          <a:off x="0" y="0"/>
+          <a:ext cx="0" cy="0"/>
+          <a:chOff x="0" y="0"/>
+          <a:chExt cx="0" cy="0"/>
+        </a:xfrm>
+      </p:grpSpPr>
+      <p:pic>
+        <p:nvPicPr>
+          <p:cNvPr id="2" name="Picture 1"/>
+          <p:cNvPicPr>
+            <a:picLocks noChangeAspect="1"/>
+          </p:cNvPicPr>
+          <p:nvPr/>
+        </p:nvPicPr>
+        <p:blipFill>
+          <a:blip r:embed="rId2"/>
+          <a:stretch>
+            <a:fillRect/>
+          </a:stretch>
+        </p:blipFill>
+        <p:spPr>
+          <a:xfrm>
+            <a:off x="2530549" y="2629538"/>
+            <a:ext cx="5200458" cy="3893872"/>
+          </a:xfrm>
+          <a:prstGeom prst="rect">
+            <a:avLst/>
+          </a:prstGeom>
+        </p:spPr>
+      </p:pic>
+      <p:sp>
+        <p:nvSpPr>
+          <p:cNvPr id="3" name="TextBox 2"/>
+          <p:cNvSpPr txBox="1"/>
+          <p:nvPr/>
+        </p:nvSpPr>
+        <p:spPr>
+          <a:xfrm>
+            <a:off x="4430907" y="2260206"/>
+            <a:ext cx="1399742" cy="369332"/>
+          </a:xfrm>
+          <a:prstGeom prst="rect">
+            <a:avLst/>
+          </a:prstGeom>
+          <a:noFill/>
+        </p:spPr>
+        <p:txBody>
+          <a:bodyPr wrap="none" rtlCol="0">
+            <a:spAutoFit/>
+          </a:bodyPr>
+          <a:lstStyle/>
+          <a:p>
+            <a:r>
+              <a:rPr lang="en-US" dirty="0" smtClean="0"/>
+              <a:t>K = 0: 0.66 :6</a:t>
+            </a:r>
+            <a:endParaRPr lang="en-US" dirty="0"/>
+          </a:p>
+        </p:txBody>
+      </p:sp>
+      <p:sp>
+        <p:nvSpPr>
+          <p:cNvPr id="4" name="Title 3"/>
+          <p:cNvSpPr>
+            <a:spLocks noGrp="1"/>
+          </p:cNvSpPr>
+          <p:nvPr>
+            <p:ph type="title"/>
+          </p:nvPr>
+        </p:nvSpPr>
+        <p:spPr/>
+        <p:txBody>
+          <a:bodyPr/>
+          <a:lstStyle/>
+          <a:p>
+            <a:r>
+              <a:rPr lang="en-US" dirty="0"/>
+              <a:t>Transforms seem relatively invariant to frequency sampling methods</a:t>
+            </a:r>
+          </a:p>
+        </p:txBody>
+      </p:sp>
+    </p:spTree>
+    <p:extLst>
+      <p:ext uri="{BB962C8B-B14F-4D97-AF65-F5344CB8AC3E}">
+        <p14:creationId xmlns:p14="http://schemas.microsoft.com/office/powerpoint/2010/main" val="1650262682"/>
+      </p:ext>
+    </p:extLst>
+  </p:cSld>
+  <p:clrMapOvr>
+    <a:masterClrMapping/>
+  </p:clrMapOvr>
+</p:sld>
+</file>
+
+<file path=ppt/slides/slide7.xml><?xml version="1.0" encoding="utf-8"?>
+<p:sld xmlns:a="http://schemas.openxmlformats.org/drawingml/2006/main" xmlns:r="http://schemas.openxmlformats.org/officeDocument/2006/relationships" xmlns:p="http://schemas.openxmlformats.org/presentationml/2006/main">
+  <p:cSld>
+    <p:spTree>
+      <p:nvGrpSpPr>
+        <p:cNvPr id="1" name=""/>
+        <p:cNvGrpSpPr/>
+        <p:nvPr/>
+      </p:nvGrpSpPr>
+      <p:grpSpPr>
+        <a:xfrm>
+          <a:off x="0" y="0"/>
+          <a:ext cx="0" cy="0"/>
+          <a:chOff x="0" y="0"/>
+          <a:chExt cx="0" cy="0"/>
+        </a:xfrm>
+      </p:grpSpPr>
+      <p:sp>
+        <p:nvSpPr>
+          <p:cNvPr id="2" name="Title 1"/>
+          <p:cNvSpPr>
+            <a:spLocks noGrp="1"/>
+          </p:cNvSpPr>
+          <p:nvPr>
+            <p:ph type="title"/>
+          </p:nvPr>
+        </p:nvSpPr>
+        <p:spPr/>
+        <p:txBody>
+          <a:bodyPr/>
+          <a:lstStyle/>
+          <a:p>
+            <a:r>
+              <a:rPr lang="en-US" dirty="0" smtClean="0"/>
+              <a:t>Choosing f how I would for Fourier</a:t>
+            </a:r>
+            <a:endParaRPr lang="en-US" dirty="0"/>
+          </a:p>
+        </p:txBody>
+      </p:sp>
+      <p:pic>
+        <p:nvPicPr>
+          <p:cNvPr id="3" name="Picture 2"/>
+          <p:cNvPicPr>
+            <a:picLocks noChangeAspect="1"/>
+          </p:cNvPicPr>
+          <p:nvPr/>
+        </p:nvPicPr>
+        <p:blipFill>
+          <a:blip r:embed="rId2"/>
+          <a:stretch>
+            <a:fillRect/>
+          </a:stretch>
+        </p:blipFill>
+        <p:spPr>
+          <a:xfrm>
+            <a:off x="398149" y="2668772"/>
+            <a:ext cx="4972429" cy="3723134"/>
+          </a:xfrm>
+          <a:prstGeom prst="rect">
+            <a:avLst/>
+          </a:prstGeom>
+        </p:spPr>
+      </p:pic>
+      <p:pic>
+        <p:nvPicPr>
+          <p:cNvPr id="4" name="Picture 3"/>
+          <p:cNvPicPr>
+            <a:picLocks noChangeAspect="1"/>
+          </p:cNvPicPr>
+          <p:nvPr/>
+        </p:nvPicPr>
+        <p:blipFill>
+          <a:blip r:embed="rId3"/>
+          <a:stretch>
+            <a:fillRect/>
+          </a:stretch>
+        </p:blipFill>
+        <p:spPr>
+          <a:xfrm>
+            <a:off x="5172875" y="2668772"/>
+            <a:ext cx="4972428" cy="3723134"/>
+          </a:xfrm>
+          <a:prstGeom prst="rect">
+            <a:avLst/>
+          </a:prstGeom>
+        </p:spPr>
+      </p:pic>
+      <p:sp>
+        <p:nvSpPr>
+          <p:cNvPr id="5" name="TextBox 4"/>
+          <p:cNvSpPr txBox="1"/>
+          <p:nvPr/>
+        </p:nvSpPr>
+        <p:spPr>
+          <a:xfrm>
+            <a:off x="3466214" y="1690688"/>
+            <a:ext cx="1781257" cy="369332"/>
+          </a:xfrm>
+          <a:prstGeom prst="rect">
+            <a:avLst/>
+          </a:prstGeom>
+          <a:noFill/>
+        </p:spPr>
+        <p:txBody>
+          <a:bodyPr wrap="none" rtlCol="0">
+            <a:spAutoFit/>
+          </a:bodyPr>
+          <a:lstStyle/>
+          <a:p>
+            <a:r>
+              <a:rPr lang="en-US" dirty="0" err="1" smtClean="0"/>
+              <a:t>f_n</a:t>
+            </a:r>
+            <a:r>
+              <a:rPr lang="en-US" dirty="0" smtClean="0"/>
+              <a:t> = 1/(N*T) * n</a:t>
+            </a:r>
+            <a:endParaRPr lang="en-US" dirty="0"/>
+          </a:p>
+        </p:txBody>
+      </p:sp>
+    </p:spTree>
+    <p:extLst>
+      <p:ext uri="{BB962C8B-B14F-4D97-AF65-F5344CB8AC3E}">
+        <p14:creationId xmlns:p14="http://schemas.microsoft.com/office/powerpoint/2010/main" val="1400985748"/>
+      </p:ext>
+    </p:extLst>
+  </p:cSld>
+  <p:clrMapOvr>
+    <a:masterClrMapping/>
+  </p:clrMapOvr>
+</p:sld>
+</file>
+
+<file path=ppt/slides/slide8.xml><?xml version="1.0" encoding="utf-8"?>
+<p:sld xmlns:a="http://schemas.openxmlformats.org/drawingml/2006/main" xmlns:r="http://schemas.openxmlformats.org/officeDocument/2006/relationships" xmlns:p="http://schemas.openxmlformats.org/presentationml/2006/main">
+  <p:cSld>
+    <p:spTree>
+      <p:nvGrpSpPr>
+        <p:cNvPr id="1" name=""/>
+        <p:cNvGrpSpPr/>
+        <p:nvPr/>
+      </p:nvGrpSpPr>
+      <p:grpSpPr>
+        <a:xfrm>
+          <a:off x="0" y="0"/>
+          <a:ext cx="0" cy="0"/>
+          <a:chOff x="0" y="0"/>
+          <a:chExt cx="0" cy="0"/>
+        </a:xfrm>
+      </p:grpSpPr>
+      <p:sp>
+        <p:nvSpPr>
+          <p:cNvPr id="2" name="Title 1"/>
+          <p:cNvSpPr>
+            <a:spLocks noGrp="1"/>
+          </p:cNvSpPr>
+          <p:nvPr>
+            <p:ph type="title"/>
+          </p:nvPr>
+        </p:nvSpPr>
+        <p:spPr/>
+        <p:txBody>
+          <a:bodyPr/>
+          <a:lstStyle/>
+          <a:p>
+            <a:endParaRPr lang="en-US"/>
+          </a:p>
+        </p:txBody>
+      </p:sp>
+      <p:pic>
+        <p:nvPicPr>
+          <p:cNvPr id="3" name="Picture 2"/>
+          <p:cNvPicPr>
+            <a:picLocks noChangeAspect="1"/>
+          </p:cNvPicPr>
+          <p:nvPr/>
+        </p:nvPicPr>
+        <p:blipFill>
+          <a:blip r:embed="rId2"/>
+          <a:stretch>
+            <a:fillRect/>
+          </a:stretch>
+        </p:blipFill>
+        <p:spPr>
+          <a:xfrm>
+            <a:off x="1973891" y="682588"/>
+            <a:ext cx="6457950" cy="5705475"/>
+          </a:xfrm>
+          <a:prstGeom prst="rect">
+            <a:avLst/>
+          </a:prstGeom>
+        </p:spPr>
+      </p:pic>
+    </p:spTree>
+    <p:extLst>
+      <p:ext uri="{BB962C8B-B14F-4D97-AF65-F5344CB8AC3E}">
+        <p14:creationId xmlns:p14="http://schemas.microsoft.com/office/powerpoint/2010/main" val="3265610225"/>
+      </p:ext>
+    </p:extLst>
+  </p:cSld>
+  <p:clrMapOvr>
+    <a:masterClrMapping/>
+  </p:clrMapOvr>
+</p:sld>
+</file>
+
+<file path=ppt/slides/slide9.xml><?xml version="1.0" encoding="utf-8"?>
+<p:sld xmlns:a="http://schemas.openxmlformats.org/drawingml/2006/main" xmlns:r="http://schemas.openxmlformats.org/officeDocument/2006/relationships" xmlns:p="http://schemas.openxmlformats.org/presentationml/2006/main">
+  <p:cSld>
+    <p:spTree>
+      <p:nvGrpSpPr>
+        <p:cNvPr id="1" name=""/>
+        <p:cNvGrpSpPr/>
+        <p:nvPr/>
+      </p:nvGrpSpPr>
+      <p:grpSpPr>
+        <a:xfrm>
+          <a:off x="0" y="0"/>
+          <a:ext cx="0" cy="0"/>
+          <a:chOff x="0" y="0"/>
+          <a:chExt cx="0" cy="0"/>
+        </a:xfrm>
+      </p:grpSpPr>
+      <p:sp>
+        <p:nvSpPr>
+          <p:cNvPr id="2" name="Title 1"/>
+          <p:cNvSpPr>
+            <a:spLocks noGrp="1"/>
+          </p:cNvSpPr>
+          <p:nvPr>
+            <p:ph type="title"/>
+          </p:nvPr>
+        </p:nvSpPr>
+        <p:spPr/>
+        <p:txBody>
+          <a:bodyPr/>
+          <a:lstStyle/>
+          <a:p>
+            <a:endParaRPr lang="en-US"/>
+          </a:p>
+        </p:txBody>
+      </p:sp>
+      <p:pic>
+        <p:nvPicPr>
+          <p:cNvPr id="3" name="Picture 2"/>
+          <p:cNvPicPr>
+            <a:picLocks noChangeAspect="1"/>
+          </p:cNvPicPr>
+          <p:nvPr/>
+        </p:nvPicPr>
+        <p:blipFill>
+          <a:blip r:embed="rId2"/>
+          <a:stretch>
+            <a:fillRect/>
+          </a:stretch>
+        </p:blipFill>
+        <p:spPr>
+          <a:xfrm>
+            <a:off x="1953400" y="2057178"/>
+            <a:ext cx="6562725" cy="3105150"/>
+          </a:xfrm>
+          <a:prstGeom prst="rect">
+            <a:avLst/>
+          </a:prstGeom>
+        </p:spPr>
+      </p:pic>
+    </p:spTree>
+    <p:extLst>
+      <p:ext uri="{BB962C8B-B14F-4D97-AF65-F5344CB8AC3E}">
+        <p14:creationId xmlns:p14="http://schemas.microsoft.com/office/powerpoint/2010/main" val="3828839806"/>
+      </p:ext>
+    </p:extLst>
+  </p:cSld>
+  <p:clrMapOvr>
+    <a:masterClrMapping/>
+  </p:clrMapOvr>
 </p:sld>
 </file>
 

</xml_diff>